<commit_message>
Work on the stop signal task
</commit_message>
<xml_diff>
--- a/Experiments.pptx
+++ b/Experiments.pptx
@@ -12,7 +12,8 @@
     <p:sldId id="261" r:id="rId9"/>
     <p:sldId id="262" r:id="rId10"/>
     <p:sldId id="263" r:id="rId11"/>
-    <p:sldId id="264" r:id="rId12"/>
+    <p:sldId id="265" r:id="rId12"/>
+    <p:sldId id="264" r:id="rId13"/>
   </p:sldIdLst>
   <p:sldSz cx="12192000" cy="6858000"/>
   <p:notesSz cx="6858000" cy="9144000"/>
@@ -3699,6 +3700,98 @@
           </a:p>
         </p:txBody>
       </p:sp>
+      <p:pic>
+        <p:nvPicPr>
+          <p:cNvPr id="4" name="Picture 2" descr="Hero Image">
+            <a:extLst>
+              <a:ext uri="{FF2B5EF4-FFF2-40B4-BE49-F238E27FC236}">
+                <a16:creationId xmlns:a16="http://schemas.microsoft.com/office/drawing/2014/main" id="{232BFEF7-C49E-FEA3-5846-F3501B2CC7AA}"/>
+              </a:ext>
+            </a:extLst>
+          </p:cNvPr>
+          <p:cNvPicPr>
+            <a:picLocks noChangeAspect="1" noChangeArrowheads="1"/>
+          </p:cNvPicPr>
+          <p:nvPr/>
+        </p:nvPicPr>
+        <p:blipFill rotWithShape="1">
+          <a:blip r:embed="rId2" cstate="print">
+            <a:extLst>
+              <a:ext uri="{28A0092B-C50C-407E-A947-70E740481C1C}">
+                <a14:useLocalDpi xmlns:a14="http://schemas.microsoft.com/office/drawing/2010/main"/>
+              </a:ext>
+            </a:extLst>
+          </a:blip>
+          <a:srcRect/>
+          <a:stretch/>
+        </p:blipFill>
+        <p:spPr bwMode="auto">
+          <a:xfrm>
+            <a:off x="2951109" y="3059217"/>
+            <a:ext cx="1188681" cy="589428"/>
+          </a:xfrm>
+          <a:prstGeom prst="rect">
+            <a:avLst/>
+          </a:prstGeom>
+          <a:noFill/>
+          <a:extLst>
+            <a:ext uri="{909E8E84-426E-40DD-AFC4-6F175D3DCCD1}">
+              <a14:hiddenFill xmlns:a14="http://schemas.microsoft.com/office/drawing/2010/main">
+                <a:solidFill>
+                  <a:srgbClr val="FFFFFF"/>
+                </a:solidFill>
+              </a14:hiddenFill>
+            </a:ext>
+          </a:extLst>
+        </p:spPr>
+      </p:pic>
+      <p:pic>
+        <p:nvPicPr>
+          <p:cNvPr id="5" name="Picture 2" descr="Hero Image">
+            <a:extLst>
+              <a:ext uri="{FF2B5EF4-FFF2-40B4-BE49-F238E27FC236}">
+                <a16:creationId xmlns:a16="http://schemas.microsoft.com/office/drawing/2014/main" id="{DF867234-DF18-901D-08A6-D10E72567389}"/>
+              </a:ext>
+            </a:extLst>
+          </p:cNvPr>
+          <p:cNvPicPr>
+            <a:picLocks noChangeAspect="1" noChangeArrowheads="1"/>
+          </p:cNvPicPr>
+          <p:nvPr/>
+        </p:nvPicPr>
+        <p:blipFill>
+          <a:blip r:embed="rId3" cstate="print">
+            <a:extLst>
+              <a:ext uri="{28A0092B-C50C-407E-A947-70E740481C1C}">
+                <a14:useLocalDpi xmlns:a14="http://schemas.microsoft.com/office/drawing/2010/main"/>
+              </a:ext>
+            </a:extLst>
+          </a:blip>
+          <a:srcRect/>
+          <a:stretch>
+            <a:fillRect/>
+          </a:stretch>
+        </p:blipFill>
+        <p:spPr bwMode="auto">
+          <a:xfrm>
+            <a:off x="5151278" y="3131829"/>
+            <a:ext cx="1188681" cy="594341"/>
+          </a:xfrm>
+          <a:prstGeom prst="rect">
+            <a:avLst/>
+          </a:prstGeom>
+          <a:noFill/>
+          <a:extLst>
+            <a:ext uri="{909E8E84-426E-40DD-AFC4-6F175D3DCCD1}">
+              <a14:hiddenFill xmlns:a14="http://schemas.microsoft.com/office/drawing/2010/main">
+                <a:solidFill>
+                  <a:srgbClr val="FFFFFF"/>
+                </a:solidFill>
+              </a14:hiddenFill>
+            </a:ext>
+          </a:extLst>
+        </p:spPr>
+      </p:pic>
     </p:spTree>
     <p:extLst>
       <p:ext uri="{BB962C8B-B14F-4D97-AF65-F5344CB8AC3E}">
@@ -3760,6 +3853,98 @@
           </a:p>
         </p:txBody>
       </p:sp>
+      <p:pic>
+        <p:nvPicPr>
+          <p:cNvPr id="4" name="Picture 2" descr="Hero Image">
+            <a:extLst>
+              <a:ext uri="{FF2B5EF4-FFF2-40B4-BE49-F238E27FC236}">
+                <a16:creationId xmlns:a16="http://schemas.microsoft.com/office/drawing/2014/main" id="{0E59E6C1-BE4F-3164-140E-E9269D7BE79F}"/>
+              </a:ext>
+            </a:extLst>
+          </p:cNvPr>
+          <p:cNvPicPr>
+            <a:picLocks noChangeAspect="1" noChangeArrowheads="1"/>
+          </p:cNvPicPr>
+          <p:nvPr/>
+        </p:nvPicPr>
+        <p:blipFill rotWithShape="1">
+          <a:blip r:embed="rId2" cstate="print">
+            <a:extLst>
+              <a:ext uri="{28A0092B-C50C-407E-A947-70E740481C1C}">
+                <a14:useLocalDpi xmlns:a14="http://schemas.microsoft.com/office/drawing/2010/main"/>
+              </a:ext>
+            </a:extLst>
+          </a:blip>
+          <a:srcRect/>
+          <a:stretch/>
+        </p:blipFill>
+        <p:spPr bwMode="auto">
+          <a:xfrm>
+            <a:off x="2975168" y="2496649"/>
+            <a:ext cx="1188681" cy="589428"/>
+          </a:xfrm>
+          <a:prstGeom prst="rect">
+            <a:avLst/>
+          </a:prstGeom>
+          <a:noFill/>
+          <a:extLst>
+            <a:ext uri="{909E8E84-426E-40DD-AFC4-6F175D3DCCD1}">
+              <a14:hiddenFill xmlns:a14="http://schemas.microsoft.com/office/drawing/2010/main">
+                <a:solidFill>
+                  <a:srgbClr val="FFFFFF"/>
+                </a:solidFill>
+              </a14:hiddenFill>
+            </a:ext>
+          </a:extLst>
+        </p:spPr>
+      </p:pic>
+      <p:pic>
+        <p:nvPicPr>
+          <p:cNvPr id="5" name="Picture 2" descr="Hero Image">
+            <a:extLst>
+              <a:ext uri="{FF2B5EF4-FFF2-40B4-BE49-F238E27FC236}">
+                <a16:creationId xmlns:a16="http://schemas.microsoft.com/office/drawing/2014/main" id="{96AD7D30-0437-808B-AB2E-7EB0FF77F57E}"/>
+              </a:ext>
+            </a:extLst>
+          </p:cNvPr>
+          <p:cNvPicPr>
+            <a:picLocks noChangeAspect="1" noChangeArrowheads="1"/>
+          </p:cNvPicPr>
+          <p:nvPr/>
+        </p:nvPicPr>
+        <p:blipFill>
+          <a:blip r:embed="rId3" cstate="print">
+            <a:extLst>
+              <a:ext uri="{28A0092B-C50C-407E-A947-70E740481C1C}">
+                <a14:useLocalDpi xmlns:a14="http://schemas.microsoft.com/office/drawing/2010/main"/>
+              </a:ext>
+            </a:extLst>
+          </a:blip>
+          <a:srcRect/>
+          <a:stretch>
+            <a:fillRect/>
+          </a:stretch>
+        </p:blipFill>
+        <p:spPr bwMode="auto">
+          <a:xfrm>
+            <a:off x="4838103" y="2496649"/>
+            <a:ext cx="1188681" cy="594341"/>
+          </a:xfrm>
+          <a:prstGeom prst="rect">
+            <a:avLst/>
+          </a:prstGeom>
+          <a:noFill/>
+          <a:extLst>
+            <a:ext uri="{909E8E84-426E-40DD-AFC4-6F175D3DCCD1}">
+              <a14:hiddenFill xmlns:a14="http://schemas.microsoft.com/office/drawing/2010/main">
+                <a:solidFill>
+                  <a:srgbClr val="FFFFFF"/>
+                </a:solidFill>
+              </a14:hiddenFill>
+            </a:ext>
+          </a:extLst>
+        </p:spPr>
+      </p:pic>
     </p:spTree>
     <p:extLst>
       <p:ext uri="{BB962C8B-B14F-4D97-AF65-F5344CB8AC3E}">
@@ -3821,6 +4006,98 @@
           </a:p>
         </p:txBody>
       </p:sp>
+      <p:pic>
+        <p:nvPicPr>
+          <p:cNvPr id="4" name="Picture 2" descr="Hero Image">
+            <a:extLst>
+              <a:ext uri="{FF2B5EF4-FFF2-40B4-BE49-F238E27FC236}">
+                <a16:creationId xmlns:a16="http://schemas.microsoft.com/office/drawing/2014/main" id="{ECF80195-E845-DD5D-696A-A8B5F1C8E5D4}"/>
+              </a:ext>
+            </a:extLst>
+          </p:cNvPr>
+          <p:cNvPicPr>
+            <a:picLocks noChangeAspect="1" noChangeArrowheads="1"/>
+          </p:cNvPicPr>
+          <p:nvPr/>
+        </p:nvPicPr>
+        <p:blipFill rotWithShape="1">
+          <a:blip r:embed="rId2" cstate="print">
+            <a:extLst>
+              <a:ext uri="{28A0092B-C50C-407E-A947-70E740481C1C}">
+                <a14:useLocalDpi xmlns:a14="http://schemas.microsoft.com/office/drawing/2010/main"/>
+              </a:ext>
+            </a:extLst>
+          </a:blip>
+          <a:srcRect/>
+          <a:stretch/>
+        </p:blipFill>
+        <p:spPr bwMode="auto">
+          <a:xfrm>
+            <a:off x="2452345" y="2607485"/>
+            <a:ext cx="1188681" cy="589428"/>
+          </a:xfrm>
+          <a:prstGeom prst="rect">
+            <a:avLst/>
+          </a:prstGeom>
+          <a:noFill/>
+          <a:extLst>
+            <a:ext uri="{909E8E84-426E-40DD-AFC4-6F175D3DCCD1}">
+              <a14:hiddenFill xmlns:a14="http://schemas.microsoft.com/office/drawing/2010/main">
+                <a:solidFill>
+                  <a:srgbClr val="FFFFFF"/>
+                </a:solidFill>
+              </a14:hiddenFill>
+            </a:ext>
+          </a:extLst>
+        </p:spPr>
+      </p:pic>
+      <p:pic>
+        <p:nvPicPr>
+          <p:cNvPr id="5" name="Picture 2" descr="Hero Image">
+            <a:extLst>
+              <a:ext uri="{FF2B5EF4-FFF2-40B4-BE49-F238E27FC236}">
+                <a16:creationId xmlns:a16="http://schemas.microsoft.com/office/drawing/2014/main" id="{BD1EEAE7-1DFD-8849-B8E7-8274C87D60A8}"/>
+              </a:ext>
+            </a:extLst>
+          </p:cNvPr>
+          <p:cNvPicPr>
+            <a:picLocks noChangeAspect="1" noChangeArrowheads="1"/>
+          </p:cNvPicPr>
+          <p:nvPr/>
+        </p:nvPicPr>
+        <p:blipFill>
+          <a:blip r:embed="rId3" cstate="print">
+            <a:extLst>
+              <a:ext uri="{28A0092B-C50C-407E-A947-70E740481C1C}">
+                <a14:useLocalDpi xmlns:a14="http://schemas.microsoft.com/office/drawing/2010/main"/>
+              </a:ext>
+            </a:extLst>
+          </a:blip>
+          <a:srcRect/>
+          <a:stretch>
+            <a:fillRect/>
+          </a:stretch>
+        </p:blipFill>
+        <p:spPr bwMode="auto">
+          <a:xfrm>
+            <a:off x="4283922" y="2725103"/>
+            <a:ext cx="1188681" cy="594341"/>
+          </a:xfrm>
+          <a:prstGeom prst="rect">
+            <a:avLst/>
+          </a:prstGeom>
+          <a:noFill/>
+          <a:extLst>
+            <a:ext uri="{909E8E84-426E-40DD-AFC4-6F175D3DCCD1}">
+              <a14:hiddenFill xmlns:a14="http://schemas.microsoft.com/office/drawing/2010/main">
+                <a:solidFill>
+                  <a:srgbClr val="FFFFFF"/>
+                </a:solidFill>
+              </a14:hiddenFill>
+            </a:ext>
+          </a:extLst>
+        </p:spPr>
+      </p:pic>
     </p:spTree>
     <p:extLst>
       <p:ext uri="{BB962C8B-B14F-4D97-AF65-F5344CB8AC3E}">
@@ -3937,12 +4214,568 @@
           <a:p>
             <a:r>
               <a:rPr lang="en-GB" dirty="0"/>
-              <a:t>Visual Cognitive Task</a:t>
+              <a:t>Visual Cognitive Task (LIO Version)</a:t>
             </a:r>
             <a:endParaRPr lang="en-DK" dirty="0"/>
           </a:p>
         </p:txBody>
       </p:sp>
+      <p:grpSp>
+        <p:nvGrpSpPr>
+          <p:cNvPr id="18" name="Group 17">
+            <a:extLst>
+              <a:ext uri="{FF2B5EF4-FFF2-40B4-BE49-F238E27FC236}">
+                <a16:creationId xmlns:a16="http://schemas.microsoft.com/office/drawing/2014/main" id="{24CE4D6C-8D71-45C4-08D5-C72AF325347D}"/>
+              </a:ext>
+            </a:extLst>
+          </p:cNvPr>
+          <p:cNvGrpSpPr/>
+          <p:nvPr/>
+        </p:nvGrpSpPr>
+        <p:grpSpPr>
+          <a:xfrm>
+            <a:off x="7535150" y="2118028"/>
+            <a:ext cx="2446378" cy="2045077"/>
+            <a:chOff x="6682509" y="1309254"/>
+            <a:chExt cx="2446378" cy="2045077"/>
+          </a:xfrm>
+        </p:grpSpPr>
+        <p:pic>
+          <p:nvPicPr>
+            <p:cNvPr id="7" name="Picture 6">
+              <a:extLst>
+                <a:ext uri="{FF2B5EF4-FFF2-40B4-BE49-F238E27FC236}">
+                  <a16:creationId xmlns:a16="http://schemas.microsoft.com/office/drawing/2014/main" id="{2B26268D-9CE3-BBDE-2433-34DEA154FDA8}"/>
+                </a:ext>
+              </a:extLst>
+            </p:cNvPr>
+            <p:cNvPicPr>
+              <a:picLocks noChangeAspect="1"/>
+            </p:cNvPicPr>
+            <p:nvPr/>
+          </p:nvPicPr>
+          <p:blipFill>
+            <a:blip r:embed="rId2"/>
+            <a:stretch>
+              <a:fillRect/>
+            </a:stretch>
+          </p:blipFill>
+          <p:spPr>
+            <a:xfrm>
+              <a:off x="7007710" y="1727843"/>
+              <a:ext cx="1748364" cy="939746"/>
+            </a:xfrm>
+            <a:prstGeom prst="rect">
+              <a:avLst/>
+            </a:prstGeom>
+          </p:spPr>
+        </p:pic>
+        <p:pic>
+          <p:nvPicPr>
+            <p:cNvPr id="9" name="Graphic 8" descr="Monitor outline">
+              <a:extLst>
+                <a:ext uri="{FF2B5EF4-FFF2-40B4-BE49-F238E27FC236}">
+                  <a16:creationId xmlns:a16="http://schemas.microsoft.com/office/drawing/2014/main" id="{3865C47D-9774-A196-9C9A-0AAFFB9F5B95}"/>
+                </a:ext>
+              </a:extLst>
+            </p:cNvPr>
+            <p:cNvPicPr>
+              <a:picLocks noChangeAspect="1"/>
+            </p:cNvPicPr>
+            <p:nvPr/>
+          </p:nvPicPr>
+          <p:blipFill>
+            <a:blip r:embed="rId3">
+              <a:extLst>
+                <a:ext uri="{96DAC541-7B7A-43D3-8B79-37D633B846F1}">
+                  <asvg:svgBlip xmlns:asvg="http://schemas.microsoft.com/office/drawing/2016/SVG/main" r:embed="rId4"/>
+                </a:ext>
+              </a:extLst>
+            </a:blip>
+            <a:stretch>
+              <a:fillRect/>
+            </a:stretch>
+          </p:blipFill>
+          <p:spPr>
+            <a:xfrm>
+              <a:off x="6682509" y="1309254"/>
+              <a:ext cx="2446378" cy="2045077"/>
+            </a:xfrm>
+            <a:prstGeom prst="rect">
+              <a:avLst/>
+            </a:prstGeom>
+          </p:spPr>
+        </p:pic>
+      </p:grpSp>
+      <p:pic>
+        <p:nvPicPr>
+          <p:cNvPr id="11" name="Picture 10">
+            <a:extLst>
+              <a:ext uri="{FF2B5EF4-FFF2-40B4-BE49-F238E27FC236}">
+                <a16:creationId xmlns:a16="http://schemas.microsoft.com/office/drawing/2014/main" id="{D3013DB1-689A-7704-09E3-17D1B3DFB5D8}"/>
+              </a:ext>
+            </a:extLst>
+          </p:cNvPr>
+          <p:cNvPicPr>
+            <a:picLocks noChangeAspect="1"/>
+          </p:cNvPicPr>
+          <p:nvPr/>
+        </p:nvPicPr>
+        <p:blipFill>
+          <a:blip r:embed="rId5"/>
+          <a:stretch>
+            <a:fillRect/>
+          </a:stretch>
+        </p:blipFill>
+        <p:spPr>
+          <a:xfrm>
+            <a:off x="2011410" y="2107843"/>
+            <a:ext cx="2424938" cy="1950280"/>
+          </a:xfrm>
+          <a:prstGeom prst="rect">
+            <a:avLst/>
+          </a:prstGeom>
+        </p:spPr>
+      </p:pic>
+      <p:pic>
+        <p:nvPicPr>
+          <p:cNvPr id="12" name="Picture 2" descr="Hero Image">
+            <a:extLst>
+              <a:ext uri="{FF2B5EF4-FFF2-40B4-BE49-F238E27FC236}">
+                <a16:creationId xmlns:a16="http://schemas.microsoft.com/office/drawing/2014/main" id="{D35884D1-DF34-1B41-41DE-E9A372FCFAD2}"/>
+              </a:ext>
+            </a:extLst>
+          </p:cNvPr>
+          <p:cNvPicPr>
+            <a:picLocks noChangeAspect="1" noChangeArrowheads="1"/>
+          </p:cNvPicPr>
+          <p:nvPr/>
+        </p:nvPicPr>
+        <p:blipFill>
+          <a:blip r:embed="rId6" cstate="print">
+            <a:extLst>
+              <a:ext uri="{28A0092B-C50C-407E-A947-70E740481C1C}">
+                <a14:useLocalDpi xmlns:a14="http://schemas.microsoft.com/office/drawing/2010/main"/>
+              </a:ext>
+            </a:extLst>
+          </a:blip>
+          <a:srcRect/>
+          <a:stretch>
+            <a:fillRect/>
+          </a:stretch>
+        </p:blipFill>
+        <p:spPr bwMode="auto">
+          <a:xfrm>
+            <a:off x="5253484" y="4090164"/>
+            <a:ext cx="1188681" cy="594341"/>
+          </a:xfrm>
+          <a:prstGeom prst="rect">
+            <a:avLst/>
+          </a:prstGeom>
+          <a:noFill/>
+          <a:extLst>
+            <a:ext uri="{909E8E84-426E-40DD-AFC4-6F175D3DCCD1}">
+              <a14:hiddenFill xmlns:a14="http://schemas.microsoft.com/office/drawing/2010/main">
+                <a:solidFill>
+                  <a:srgbClr val="FFFFFF"/>
+                </a:solidFill>
+              </a14:hiddenFill>
+            </a:ext>
+          </a:extLst>
+        </p:spPr>
+      </p:pic>
+      <p:pic>
+        <p:nvPicPr>
+          <p:cNvPr id="13" name="Picture 12" descr="A close up of a controller&#10;&#10;Description automatically generated">
+            <a:extLst>
+              <a:ext uri="{FF2B5EF4-FFF2-40B4-BE49-F238E27FC236}">
+                <a16:creationId xmlns:a16="http://schemas.microsoft.com/office/drawing/2014/main" id="{09B5128D-98DB-F212-3FE1-7CD2507BA86B}"/>
+              </a:ext>
+            </a:extLst>
+          </p:cNvPr>
+          <p:cNvPicPr>
+            <a:picLocks noChangeAspect="1"/>
+          </p:cNvPicPr>
+          <p:nvPr/>
+        </p:nvPicPr>
+        <p:blipFill>
+          <a:blip r:embed="rId7" cstate="print">
+            <a:extLst>
+              <a:ext uri="{28A0092B-C50C-407E-A947-70E740481C1C}">
+                <a14:useLocalDpi xmlns:a14="http://schemas.microsoft.com/office/drawing/2010/main"/>
+              </a:ext>
+            </a:extLst>
+          </a:blip>
+          <a:stretch>
+            <a:fillRect/>
+          </a:stretch>
+        </p:blipFill>
+        <p:spPr>
+          <a:xfrm>
+            <a:off x="7240743" y="4658188"/>
+            <a:ext cx="1087193" cy="815395"/>
+          </a:xfrm>
+          <a:prstGeom prst="rect">
+            <a:avLst/>
+          </a:prstGeom>
+        </p:spPr>
+      </p:pic>
+      <p:pic>
+        <p:nvPicPr>
+          <p:cNvPr id="16" name="Picture 15">
+            <a:extLst>
+              <a:ext uri="{FF2B5EF4-FFF2-40B4-BE49-F238E27FC236}">
+                <a16:creationId xmlns:a16="http://schemas.microsoft.com/office/drawing/2014/main" id="{579CA527-05EC-09F9-4F12-FEF68B91B9A4}"/>
+              </a:ext>
+            </a:extLst>
+          </p:cNvPr>
+          <p:cNvPicPr>
+            <a:picLocks noChangeAspect="1"/>
+          </p:cNvPicPr>
+          <p:nvPr/>
+        </p:nvPicPr>
+        <p:blipFill>
+          <a:blip r:embed="rId8" cstate="print">
+            <a:extLst>
+              <a:ext uri="{28A0092B-C50C-407E-A947-70E740481C1C}">
+                <a14:useLocalDpi xmlns:a14="http://schemas.microsoft.com/office/drawing/2010/main"/>
+              </a:ext>
+            </a:extLst>
+          </a:blip>
+          <a:stretch>
+            <a:fillRect/>
+          </a:stretch>
+        </p:blipFill>
+        <p:spPr>
+          <a:xfrm>
+            <a:off x="7377694" y="3354758"/>
+            <a:ext cx="314912" cy="477470"/>
+          </a:xfrm>
+          <a:prstGeom prst="rect">
+            <a:avLst/>
+          </a:prstGeom>
+        </p:spPr>
+      </p:pic>
+      <p:cxnSp>
+        <p:nvCxnSpPr>
+          <p:cNvPr id="20" name="Connector: Elbow 19">
+            <a:extLst>
+              <a:ext uri="{FF2B5EF4-FFF2-40B4-BE49-F238E27FC236}">
+                <a16:creationId xmlns:a16="http://schemas.microsoft.com/office/drawing/2014/main" id="{40A91E0F-5210-D05C-1C1F-161664DF4A8D}"/>
+              </a:ext>
+            </a:extLst>
+          </p:cNvPr>
+          <p:cNvCxnSpPr>
+            <a:cxnSpLocks/>
+            <a:stCxn id="16" idx="1"/>
+            <a:endCxn id="12" idx="3"/>
+          </p:cNvCxnSpPr>
+          <p:nvPr/>
+        </p:nvCxnSpPr>
+        <p:spPr>
+          <a:xfrm rot="10800000" flipV="1">
+            <a:off x="6442166" y="3593493"/>
+            <a:ext cx="935529" cy="793842"/>
+          </a:xfrm>
+          <a:prstGeom prst="bentConnector3">
+            <a:avLst>
+              <a:gd name="adj1" fmla="val 50000"/>
+            </a:avLst>
+          </a:prstGeom>
+          <a:ln w="38100">
+            <a:tailEnd type="triangle"/>
+          </a:ln>
+        </p:spPr>
+        <p:style>
+          <a:lnRef idx="1">
+            <a:schemeClr val="accent1"/>
+          </a:lnRef>
+          <a:fillRef idx="0">
+            <a:schemeClr val="accent1"/>
+          </a:fillRef>
+          <a:effectRef idx="0">
+            <a:schemeClr val="accent1"/>
+          </a:effectRef>
+          <a:fontRef idx="minor">
+            <a:schemeClr val="tx1"/>
+          </a:fontRef>
+        </p:style>
+      </p:cxnSp>
+      <p:cxnSp>
+        <p:nvCxnSpPr>
+          <p:cNvPr id="24" name="Connector: Elbow 23">
+            <a:extLst>
+              <a:ext uri="{FF2B5EF4-FFF2-40B4-BE49-F238E27FC236}">
+                <a16:creationId xmlns:a16="http://schemas.microsoft.com/office/drawing/2014/main" id="{97BC521F-FF41-D37A-D51A-C1C42BE3FEFF}"/>
+              </a:ext>
+            </a:extLst>
+          </p:cNvPr>
+          <p:cNvCxnSpPr>
+            <a:cxnSpLocks/>
+            <a:stCxn id="13" idx="1"/>
+            <a:endCxn id="12" idx="2"/>
+          </p:cNvCxnSpPr>
+          <p:nvPr/>
+        </p:nvCxnSpPr>
+        <p:spPr>
+          <a:xfrm rot="10800000">
+            <a:off x="5847825" y="4684506"/>
+            <a:ext cx="1392918" cy="381381"/>
+          </a:xfrm>
+          <a:prstGeom prst="bentConnector2">
+            <a:avLst/>
+          </a:prstGeom>
+          <a:ln w="38100">
+            <a:tailEnd type="triangle"/>
+          </a:ln>
+        </p:spPr>
+        <p:style>
+          <a:lnRef idx="1">
+            <a:schemeClr val="accent1"/>
+          </a:lnRef>
+          <a:fillRef idx="0">
+            <a:schemeClr val="accent1"/>
+          </a:fillRef>
+          <a:effectRef idx="0">
+            <a:schemeClr val="accent1"/>
+          </a:effectRef>
+          <a:fontRef idx="minor">
+            <a:schemeClr val="tx1"/>
+          </a:fontRef>
+        </p:style>
+      </p:cxnSp>
+      <p:cxnSp>
+        <p:nvCxnSpPr>
+          <p:cNvPr id="29" name="Connector: Elbow 28">
+            <a:extLst>
+              <a:ext uri="{FF2B5EF4-FFF2-40B4-BE49-F238E27FC236}">
+                <a16:creationId xmlns:a16="http://schemas.microsoft.com/office/drawing/2014/main" id="{610B9F3B-610D-F372-D515-1184D48B1319}"/>
+              </a:ext>
+            </a:extLst>
+          </p:cNvPr>
+          <p:cNvCxnSpPr>
+            <a:cxnSpLocks/>
+            <a:stCxn id="12" idx="1"/>
+            <a:endCxn id="11" idx="2"/>
+          </p:cNvCxnSpPr>
+          <p:nvPr/>
+        </p:nvCxnSpPr>
+        <p:spPr>
+          <a:xfrm rot="10800000">
+            <a:off x="3223880" y="4058123"/>
+            <a:ext cx="2029605" cy="329212"/>
+          </a:xfrm>
+          <a:prstGeom prst="bentConnector2">
+            <a:avLst/>
+          </a:prstGeom>
+          <a:ln w="38100">
+            <a:headEnd type="triangle"/>
+            <a:tailEnd type="triangle"/>
+          </a:ln>
+        </p:spPr>
+        <p:style>
+          <a:lnRef idx="1">
+            <a:schemeClr val="accent1"/>
+          </a:lnRef>
+          <a:fillRef idx="0">
+            <a:schemeClr val="accent1"/>
+          </a:fillRef>
+          <a:effectRef idx="0">
+            <a:schemeClr val="accent1"/>
+          </a:effectRef>
+          <a:fontRef idx="minor">
+            <a:schemeClr val="tx1"/>
+          </a:fontRef>
+        </p:style>
+      </p:cxnSp>
+      <p:sp>
+        <p:nvSpPr>
+          <p:cNvPr id="30" name="TextBox 29">
+            <a:extLst>
+              <a:ext uri="{FF2B5EF4-FFF2-40B4-BE49-F238E27FC236}">
+                <a16:creationId xmlns:a16="http://schemas.microsoft.com/office/drawing/2014/main" id="{EEBA07FC-B8BB-D99F-36F4-2CBDB7C39910}"/>
+              </a:ext>
+            </a:extLst>
+          </p:cNvPr>
+          <p:cNvSpPr txBox="1"/>
+          <p:nvPr/>
+        </p:nvSpPr>
+        <p:spPr>
+          <a:xfrm>
+            <a:off x="5129999" y="3787690"/>
+            <a:ext cx="1182503" cy="307777"/>
+          </a:xfrm>
+          <a:prstGeom prst="rect">
+            <a:avLst/>
+          </a:prstGeom>
+          <a:noFill/>
+        </p:spPr>
+        <p:txBody>
+          <a:bodyPr wrap="none" rtlCol="0">
+            <a:spAutoFit/>
+          </a:bodyPr>
+          <a:lstStyle/>
+          <a:p>
+            <a:r>
+              <a:rPr lang="en-GB" sz="1400" dirty="0"/>
+              <a:t>LabBench I/O</a:t>
+            </a:r>
+            <a:endParaRPr lang="en-DK" sz="1400" dirty="0"/>
+          </a:p>
+        </p:txBody>
+      </p:sp>
+      <p:sp>
+        <p:nvSpPr>
+          <p:cNvPr id="31" name="TextBox 30">
+            <a:extLst>
+              <a:ext uri="{FF2B5EF4-FFF2-40B4-BE49-F238E27FC236}">
+                <a16:creationId xmlns:a16="http://schemas.microsoft.com/office/drawing/2014/main" id="{C9BE7B04-78AF-C34F-05B5-2E06CF93F74B}"/>
+              </a:ext>
+            </a:extLst>
+          </p:cNvPr>
+          <p:cNvSpPr txBox="1"/>
+          <p:nvPr/>
+        </p:nvSpPr>
+        <p:spPr>
+          <a:xfrm>
+            <a:off x="7169552" y="4376728"/>
+            <a:ext cx="1208216" cy="307777"/>
+          </a:xfrm>
+          <a:prstGeom prst="rect">
+            <a:avLst/>
+          </a:prstGeom>
+          <a:noFill/>
+        </p:spPr>
+        <p:txBody>
+          <a:bodyPr wrap="none" rtlCol="0">
+            <a:spAutoFit/>
+          </a:bodyPr>
+          <a:lstStyle/>
+          <a:p>
+            <a:r>
+              <a:rPr lang="en-GB" sz="1400" dirty="0"/>
+              <a:t>LabBench PAD</a:t>
+            </a:r>
+            <a:endParaRPr lang="en-DK" sz="1400" dirty="0"/>
+          </a:p>
+        </p:txBody>
+      </p:sp>
+      <p:sp>
+        <p:nvSpPr>
+          <p:cNvPr id="32" name="TextBox 31">
+            <a:extLst>
+              <a:ext uri="{FF2B5EF4-FFF2-40B4-BE49-F238E27FC236}">
+                <a16:creationId xmlns:a16="http://schemas.microsoft.com/office/drawing/2014/main" id="{86599B2A-7942-CF74-A11D-9045E2FB6B94}"/>
+              </a:ext>
+            </a:extLst>
+          </p:cNvPr>
+          <p:cNvSpPr txBox="1"/>
+          <p:nvPr/>
+        </p:nvSpPr>
+        <p:spPr>
+          <a:xfrm>
+            <a:off x="7670498" y="2069827"/>
+            <a:ext cx="1592295" cy="369332"/>
+          </a:xfrm>
+          <a:prstGeom prst="rect">
+            <a:avLst/>
+          </a:prstGeom>
+          <a:noFill/>
+        </p:spPr>
+        <p:txBody>
+          <a:bodyPr wrap="none" rtlCol="0">
+            <a:spAutoFit/>
+          </a:bodyPr>
+          <a:lstStyle/>
+          <a:p>
+            <a:r>
+              <a:rPr lang="en-GB" dirty="0"/>
+              <a:t>Subject Display</a:t>
+            </a:r>
+            <a:endParaRPr lang="en-DK" dirty="0"/>
+          </a:p>
+        </p:txBody>
+      </p:sp>
+      <p:sp>
+        <p:nvSpPr>
+          <p:cNvPr id="33" name="TextBox 32">
+            <a:extLst>
+              <a:ext uri="{FF2B5EF4-FFF2-40B4-BE49-F238E27FC236}">
+                <a16:creationId xmlns:a16="http://schemas.microsoft.com/office/drawing/2014/main" id="{005BD2C3-6318-0256-4AB9-5269D6509CF2}"/>
+              </a:ext>
+            </a:extLst>
+          </p:cNvPr>
+          <p:cNvSpPr txBox="1"/>
+          <p:nvPr/>
+        </p:nvSpPr>
+        <p:spPr>
+          <a:xfrm>
+            <a:off x="1917174" y="1810251"/>
+            <a:ext cx="1563248" cy="307777"/>
+          </a:xfrm>
+          <a:prstGeom prst="rect">
+            <a:avLst/>
+          </a:prstGeom>
+          <a:noFill/>
+        </p:spPr>
+        <p:txBody>
+          <a:bodyPr wrap="none" rtlCol="0">
+            <a:spAutoFit/>
+          </a:bodyPr>
+          <a:lstStyle/>
+          <a:p>
+            <a:r>
+              <a:rPr lang="en-GB" sz="1400" dirty="0"/>
+              <a:t>LabBench Software</a:t>
+            </a:r>
+            <a:endParaRPr lang="en-DK" sz="1400" dirty="0"/>
+          </a:p>
+        </p:txBody>
+      </p:sp>
+      <p:cxnSp>
+        <p:nvCxnSpPr>
+          <p:cNvPr id="40" name="Connector: Elbow 39">
+            <a:extLst>
+              <a:ext uri="{FF2B5EF4-FFF2-40B4-BE49-F238E27FC236}">
+                <a16:creationId xmlns:a16="http://schemas.microsoft.com/office/drawing/2014/main" id="{572CC260-085D-2ABB-EDE3-AF5375441B19}"/>
+              </a:ext>
+            </a:extLst>
+          </p:cNvPr>
+          <p:cNvCxnSpPr>
+            <a:cxnSpLocks/>
+            <a:stCxn id="11" idx="3"/>
+          </p:cNvCxnSpPr>
+          <p:nvPr/>
+        </p:nvCxnSpPr>
+        <p:spPr>
+          <a:xfrm>
+            <a:off x="4436348" y="3082983"/>
+            <a:ext cx="3256257" cy="923"/>
+          </a:xfrm>
+          <a:prstGeom prst="bentConnector3">
+            <a:avLst>
+              <a:gd name="adj1" fmla="val 50000"/>
+            </a:avLst>
+          </a:prstGeom>
+          <a:ln w="38100">
+            <a:tailEnd type="triangle"/>
+          </a:ln>
+        </p:spPr>
+        <p:style>
+          <a:lnRef idx="1">
+            <a:schemeClr val="accent1"/>
+          </a:lnRef>
+          <a:fillRef idx="0">
+            <a:schemeClr val="accent1"/>
+          </a:fillRef>
+          <a:effectRef idx="0">
+            <a:schemeClr val="accent1"/>
+          </a:effectRef>
+          <a:fontRef idx="minor">
+            <a:schemeClr val="tx1"/>
+          </a:fontRef>
+        </p:style>
+      </p:cxnSp>
     </p:spTree>
     <p:extLst>
       <p:ext uri="{BB962C8B-B14F-4D97-AF65-F5344CB8AC3E}">
@@ -3978,7 +4811,7 @@
           <p:cNvPr id="2" name="Title 1">
             <a:extLst>
               <a:ext uri="{FF2B5EF4-FFF2-40B4-BE49-F238E27FC236}">
-                <a16:creationId xmlns:a16="http://schemas.microsoft.com/office/drawing/2014/main" id="{27A40560-236C-AE23-06FE-904077107570}"/>
+                <a16:creationId xmlns:a16="http://schemas.microsoft.com/office/drawing/2014/main" id="{5409996D-5A72-B552-62D5-EF68A146B071}"/>
               </a:ext>
             </a:extLst>
           </p:cNvPr>
@@ -3991,7 +4824,102 @@
         </p:nvSpPr>
         <p:spPr/>
         <p:txBody>
-          <a:bodyPr/>
+          <a:bodyPr>
+            <a:normAutofit fontScale="90000"/>
+          </a:bodyPr>
+          <a:lstStyle/>
+          <a:p>
+            <a:endParaRPr lang="en-DK" dirty="0"/>
+          </a:p>
+        </p:txBody>
+      </p:sp>
+      <p:pic>
+        <p:nvPicPr>
+          <p:cNvPr id="3" name="Picture 2">
+            <a:extLst>
+              <a:ext uri="{FF2B5EF4-FFF2-40B4-BE49-F238E27FC236}">
+                <a16:creationId xmlns:a16="http://schemas.microsoft.com/office/drawing/2014/main" id="{0CFA1693-A8C9-2C48-CB11-25CF999375F1}"/>
+              </a:ext>
+            </a:extLst>
+          </p:cNvPr>
+          <p:cNvPicPr>
+            <a:picLocks noChangeAspect="1"/>
+          </p:cNvPicPr>
+          <p:nvPr/>
+        </p:nvPicPr>
+        <p:blipFill>
+          <a:blip r:embed="rId2">
+            <a:extLst>
+              <a:ext uri="{28A0092B-C50C-407E-A947-70E740481C1C}">
+                <a14:useLocalDpi xmlns:a14="http://schemas.microsoft.com/office/drawing/2010/main" val="0"/>
+              </a:ext>
+            </a:extLst>
+          </a:blip>
+          <a:stretch>
+            <a:fillRect/>
+          </a:stretch>
+        </p:blipFill>
+        <p:spPr>
+          <a:xfrm>
+            <a:off x="1988457" y="1289437"/>
+            <a:ext cx="8138208" cy="4469587"/>
+          </a:xfrm>
+          <a:prstGeom prst="rect">
+            <a:avLst/>
+          </a:prstGeom>
+        </p:spPr>
+      </p:pic>
+    </p:spTree>
+    <p:extLst>
+      <p:ext uri="{BB962C8B-B14F-4D97-AF65-F5344CB8AC3E}">
+        <p14:creationId xmlns:p14="http://schemas.microsoft.com/office/powerpoint/2010/main" val="97887138"/>
+      </p:ext>
+    </p:extLst>
+  </p:cSld>
+  <p:clrMapOvr>
+    <a:masterClrMapping/>
+  </p:clrMapOvr>
+</p:sld>
+</file>
+
+<file path=ppt/slides/slide9.xml><?xml version="1.0" encoding="utf-8"?>
+<p:sld xmlns:a="http://schemas.openxmlformats.org/drawingml/2006/main" xmlns:r="http://schemas.openxmlformats.org/officeDocument/2006/relationships" xmlns:p="http://schemas.openxmlformats.org/presentationml/2006/main">
+  <p:cSld>
+    <p:spTree>
+      <p:nvGrpSpPr>
+        <p:cNvPr id="1" name=""/>
+        <p:cNvGrpSpPr/>
+        <p:nvPr/>
+      </p:nvGrpSpPr>
+      <p:grpSpPr>
+        <a:xfrm>
+          <a:off x="0" y="0"/>
+          <a:ext cx="0" cy="0"/>
+          <a:chOff x="0" y="0"/>
+          <a:chExt cx="0" cy="0"/>
+        </a:xfrm>
+      </p:grpSpPr>
+      <p:sp>
+        <p:nvSpPr>
+          <p:cNvPr id="2" name="Title 1">
+            <a:extLst>
+              <a:ext uri="{FF2B5EF4-FFF2-40B4-BE49-F238E27FC236}">
+                <a16:creationId xmlns:a16="http://schemas.microsoft.com/office/drawing/2014/main" id="{27A40560-236C-AE23-06FE-904077107570}"/>
+              </a:ext>
+            </a:extLst>
+          </p:cNvPr>
+          <p:cNvSpPr>
+            <a:spLocks noGrp="1"/>
+          </p:cNvSpPr>
+          <p:nvPr>
+            <p:ph type="title"/>
+          </p:nvPr>
+        </p:nvSpPr>
+        <p:spPr/>
+        <p:txBody>
+          <a:bodyPr>
+            <a:normAutofit fontScale="90000"/>
+          </a:bodyPr>
           <a:lstStyle/>
           <a:p>
             <a:endParaRPr lang="en-DK" dirty="0"/>
@@ -4308,6 +5236,15 @@
 </file>
 
 <file path=customXml/item1.xml><?xml version="1.0" encoding="utf-8"?>
+<?mso-contentType ?>
+<FormTemplates xmlns="http://schemas.microsoft.com/sharepoint/v3/contenttype/forms">
+  <Display>DocumentLibraryForm</Display>
+  <Edit>DocumentLibraryForm</Edit>
+  <New>DocumentLibraryForm</New>
+</FormTemplates>
+</file>
+
+<file path=customXml/item2.xml><?xml version="1.0" encoding="utf-8"?>
 <p:properties xmlns:p="http://schemas.microsoft.com/office/2006/metadata/properties" xmlns:xsi="http://www.w3.org/2001/XMLSchema-instance" xmlns:pc="http://schemas.microsoft.com/office/infopath/2007/PartnerControls">
   <documentManagement>
     <TaxCatchAll xmlns="6dfb7b4b-871d-4c24-9d42-16b14ecd044c" xsi:nil="true"/>
@@ -4316,15 +5253,6 @@
     </lcf76f155ced4ddcb4097134ff3c332f>
   </documentManagement>
 </p:properties>
-</file>
-
-<file path=customXml/item2.xml><?xml version="1.0" encoding="utf-8"?>
-<?mso-contentType ?>
-<FormTemplates xmlns="http://schemas.microsoft.com/sharepoint/v3/contenttype/forms">
-  <Display>DocumentLibraryForm</Display>
-  <Edit>DocumentLibraryForm</Edit>
-  <New>DocumentLibraryForm</New>
-</FormTemplates>
 </file>
 
 <file path=customXml/item3.xml><?xml version="1.0" encoding="utf-8"?>
@@ -4583,20 +5511,20 @@
 </file>
 
 <file path=customXml/itemProps1.xml><?xml version="1.0" encoding="utf-8"?>
+<ds:datastoreItem xmlns:ds="http://schemas.openxmlformats.org/officeDocument/2006/customXml" ds:itemID="{B3784A21-AD5D-423F-81C7-D396C0BFBE45}">
+  <ds:schemaRefs>
+    <ds:schemaRef ds:uri="http://schemas.microsoft.com/sharepoint/v3/contenttype/forms"/>
+  </ds:schemaRefs>
+</ds:datastoreItem>
+</file>
+
+<file path=customXml/itemProps2.xml><?xml version="1.0" encoding="utf-8"?>
 <ds:datastoreItem xmlns:ds="http://schemas.openxmlformats.org/officeDocument/2006/customXml" ds:itemID="{7B268842-BF5C-45DB-BB6A-ECAAECBC831B}">
   <ds:schemaRefs>
     <ds:schemaRef ds:uri="http://schemas.microsoft.com/office/2006/metadata/properties"/>
     <ds:schemaRef ds:uri="http://schemas.microsoft.com/office/infopath/2007/PartnerControls"/>
     <ds:schemaRef ds:uri="6dfb7b4b-871d-4c24-9d42-16b14ecd044c"/>
     <ds:schemaRef ds:uri="51c7d8ad-74c8-4833-8478-0d0a5cafce0c"/>
-  </ds:schemaRefs>
-</ds:datastoreItem>
-</file>
-
-<file path=customXml/itemProps2.xml><?xml version="1.0" encoding="utf-8"?>
-<ds:datastoreItem xmlns:ds="http://schemas.openxmlformats.org/officeDocument/2006/customXml" ds:itemID="{B3784A21-AD5D-423F-81C7-D396C0BFBE45}">
-  <ds:schemaRefs>
-    <ds:schemaRef ds:uri="http://schemas.microsoft.com/sharepoint/v3/contenttype/forms"/>
   </ds:schemaRefs>
 </ds:datastoreItem>
 </file>

</xml_diff>